<commit_message>
change consent form size
</commit_message>
<xml_diff>
--- a/static/Category_learning/Stimuli/Consent/Consent.pptx
+++ b/static/Category_learning/Stimuli/Consent/Consent.pptx
@@ -5,10 +5,11 @@
     <p:sldMasterId id="2147483648" r:id="rId1"/>
   </p:sldMasterIdLst>
   <p:notesMasterIdLst>
-    <p:notesMasterId r:id="rId3"/>
+    <p:notesMasterId r:id="rId4"/>
   </p:notesMasterIdLst>
   <p:sldIdLst>
     <p:sldId id="273" r:id="rId2"/>
+    <p:sldId id="274" r:id="rId3"/>
   </p:sldIdLst>
   <p:sldSz cx="12192000" cy="6858000"/>
   <p:notesSz cx="6858000" cy="9144000"/>
@@ -197,7 +198,7 @@
           <a:p>
             <a:fld id="{2286492A-2CA2-E643-8AA6-7A3DBD9E2B39}" type="datetimeFigureOut">
               <a:rPr lang="en-US" smtClean="0"/>
-              <a:t>6/22/21</a:t>
+              <a:t>5/24/22</a:t>
             </a:fld>
             <a:endParaRPr lang="en-US"/>
           </a:p>
@@ -548,6 +549,90 @@
 </p:notes>
 </file>
 
+<file path=ppt/notesSlides/notesSlide2.xml><?xml version="1.0" encoding="utf-8"?>
+<p:notes xmlns:a="http://schemas.openxmlformats.org/drawingml/2006/main" xmlns:r="http://schemas.openxmlformats.org/officeDocument/2006/relationships" xmlns:p="http://schemas.openxmlformats.org/presentationml/2006/main">
+  <p:cSld>
+    <p:spTree>
+      <p:nvGrpSpPr>
+        <p:cNvPr id="1" name=""/>
+        <p:cNvGrpSpPr/>
+        <p:nvPr/>
+      </p:nvGrpSpPr>
+      <p:grpSpPr>
+        <a:xfrm>
+          <a:off x="0" y="0"/>
+          <a:ext cx="0" cy="0"/>
+          <a:chOff x="0" y="0"/>
+          <a:chExt cx="0" cy="0"/>
+        </a:xfrm>
+      </p:grpSpPr>
+      <p:sp>
+        <p:nvSpPr>
+          <p:cNvPr id="2" name="Slide Image Placeholder 1"/>
+          <p:cNvSpPr>
+            <a:spLocks noGrp="1" noRot="1" noChangeAspect="1"/>
+          </p:cNvSpPr>
+          <p:nvPr>
+            <p:ph type="sldImg"/>
+          </p:nvPr>
+        </p:nvSpPr>
+        <p:spPr/>
+      </p:sp>
+      <p:sp>
+        <p:nvSpPr>
+          <p:cNvPr id="3" name="Notes Placeholder 2"/>
+          <p:cNvSpPr>
+            <a:spLocks noGrp="1"/>
+          </p:cNvSpPr>
+          <p:nvPr>
+            <p:ph type="body" idx="1"/>
+          </p:nvPr>
+        </p:nvSpPr>
+        <p:spPr/>
+        <p:txBody>
+          <a:bodyPr/>
+          <a:lstStyle/>
+          <a:p>
+            <a:endParaRPr lang="en-US" dirty="0"/>
+          </a:p>
+        </p:txBody>
+      </p:sp>
+      <p:sp>
+        <p:nvSpPr>
+          <p:cNvPr id="4" name="Slide Number Placeholder 3"/>
+          <p:cNvSpPr>
+            <a:spLocks noGrp="1"/>
+          </p:cNvSpPr>
+          <p:nvPr>
+            <p:ph type="sldNum" sz="quarter" idx="5"/>
+          </p:nvPr>
+        </p:nvSpPr>
+        <p:spPr/>
+        <p:txBody>
+          <a:bodyPr/>
+          <a:lstStyle/>
+          <a:p>
+            <a:fld id="{076B060D-D020-B54C-829E-DB3A4113A29E}" type="slidenum">
+              <a:rPr lang="en-US" smtClean="0"/>
+              <a:t>2</a:t>
+            </a:fld>
+            <a:endParaRPr lang="en-US"/>
+          </a:p>
+        </p:txBody>
+      </p:sp>
+    </p:spTree>
+    <p:extLst>
+      <p:ext uri="{BB962C8B-B14F-4D97-AF65-F5344CB8AC3E}">
+        <p14:creationId xmlns:p14="http://schemas.microsoft.com/office/powerpoint/2010/main" val="4279591290"/>
+      </p:ext>
+    </p:extLst>
+  </p:cSld>
+  <p:clrMapOvr>
+    <a:masterClrMapping/>
+  </p:clrMapOvr>
+</p:notes>
+</file>
+
 <file path=ppt/slideLayouts/slideLayout1.xml><?xml version="1.0" encoding="utf-8"?>
 <p:sldLayout xmlns:a="http://schemas.openxmlformats.org/drawingml/2006/main" xmlns:r="http://schemas.openxmlformats.org/officeDocument/2006/relationships" xmlns:p="http://schemas.openxmlformats.org/presentationml/2006/main" type="title" preserve="1">
   <p:cSld name="Title Slide">
@@ -695,7 +780,7 @@
           <a:p>
             <a:fld id="{BA5230AD-8316-4848-86F6-EF97FAB217B6}" type="datetimeFigureOut">
               <a:rPr lang="en-US" smtClean="0"/>
-              <a:t>6/22/21</a:t>
+              <a:t>5/24/22</a:t>
             </a:fld>
             <a:endParaRPr lang="en-US"/>
           </a:p>
@@ -893,7 +978,7 @@
           <a:p>
             <a:fld id="{BA5230AD-8316-4848-86F6-EF97FAB217B6}" type="datetimeFigureOut">
               <a:rPr lang="en-US" smtClean="0"/>
-              <a:t>6/22/21</a:t>
+              <a:t>5/24/22</a:t>
             </a:fld>
             <a:endParaRPr lang="en-US"/>
           </a:p>
@@ -1101,7 +1186,7 @@
           <a:p>
             <a:fld id="{BA5230AD-8316-4848-86F6-EF97FAB217B6}" type="datetimeFigureOut">
               <a:rPr lang="en-US" smtClean="0"/>
-              <a:t>6/22/21</a:t>
+              <a:t>5/24/22</a:t>
             </a:fld>
             <a:endParaRPr lang="en-US"/>
           </a:p>
@@ -1299,7 +1384,7 @@
           <a:p>
             <a:fld id="{BA5230AD-8316-4848-86F6-EF97FAB217B6}" type="datetimeFigureOut">
               <a:rPr lang="en-US" smtClean="0"/>
-              <a:t>6/22/21</a:t>
+              <a:t>5/24/22</a:t>
             </a:fld>
             <a:endParaRPr lang="en-US"/>
           </a:p>
@@ -1574,7 +1659,7 @@
           <a:p>
             <a:fld id="{BA5230AD-8316-4848-86F6-EF97FAB217B6}" type="datetimeFigureOut">
               <a:rPr lang="en-US" smtClean="0"/>
-              <a:t>6/22/21</a:t>
+              <a:t>5/24/22</a:t>
             </a:fld>
             <a:endParaRPr lang="en-US"/>
           </a:p>
@@ -1839,7 +1924,7 @@
           <a:p>
             <a:fld id="{BA5230AD-8316-4848-86F6-EF97FAB217B6}" type="datetimeFigureOut">
               <a:rPr lang="en-US" smtClean="0"/>
-              <a:t>6/22/21</a:t>
+              <a:t>5/24/22</a:t>
             </a:fld>
             <a:endParaRPr lang="en-US"/>
           </a:p>
@@ -2251,7 +2336,7 @@
           <a:p>
             <a:fld id="{BA5230AD-8316-4848-86F6-EF97FAB217B6}" type="datetimeFigureOut">
               <a:rPr lang="en-US" smtClean="0"/>
-              <a:t>6/22/21</a:t>
+              <a:t>5/24/22</a:t>
             </a:fld>
             <a:endParaRPr lang="en-US"/>
           </a:p>
@@ -2392,7 +2477,7 @@
           <a:p>
             <a:fld id="{BA5230AD-8316-4848-86F6-EF97FAB217B6}" type="datetimeFigureOut">
               <a:rPr lang="en-US" smtClean="0"/>
-              <a:t>6/22/21</a:t>
+              <a:t>5/24/22</a:t>
             </a:fld>
             <a:endParaRPr lang="en-US"/>
           </a:p>
@@ -2505,7 +2590,7 @@
           <a:p>
             <a:fld id="{BA5230AD-8316-4848-86F6-EF97FAB217B6}" type="datetimeFigureOut">
               <a:rPr lang="en-US" smtClean="0"/>
-              <a:t>6/22/21</a:t>
+              <a:t>5/24/22</a:t>
             </a:fld>
             <a:endParaRPr lang="en-US"/>
           </a:p>
@@ -2816,7 +2901,7 @@
           <a:p>
             <a:fld id="{BA5230AD-8316-4848-86F6-EF97FAB217B6}" type="datetimeFigureOut">
               <a:rPr lang="en-US" smtClean="0"/>
-              <a:t>6/22/21</a:t>
+              <a:t>5/24/22</a:t>
             </a:fld>
             <a:endParaRPr lang="en-US"/>
           </a:p>
@@ -3104,7 +3189,7 @@
           <a:p>
             <a:fld id="{BA5230AD-8316-4848-86F6-EF97FAB217B6}" type="datetimeFigureOut">
               <a:rPr lang="en-US" smtClean="0"/>
-              <a:t>6/22/21</a:t>
+              <a:t>5/24/22</a:t>
             </a:fld>
             <a:endParaRPr lang="en-US"/>
           </a:p>
@@ -3345,7 +3430,7 @@
           <a:p>
             <a:fld id="{BA5230AD-8316-4848-86F6-EF97FAB217B6}" type="datetimeFigureOut">
               <a:rPr lang="en-US" smtClean="0"/>
-              <a:t>6/22/21</a:t>
+              <a:t>5/24/22</a:t>
             </a:fld>
             <a:endParaRPr lang="en-US"/>
           </a:p>
@@ -3846,6 +3931,411 @@
     <p:extLst>
       <p:ext uri="{BB962C8B-B14F-4D97-AF65-F5344CB8AC3E}">
         <p14:creationId xmlns:p14="http://schemas.microsoft.com/office/powerpoint/2010/main" val="1743075632"/>
+      </p:ext>
+    </p:extLst>
+  </p:cSld>
+  <p:clrMapOvr>
+    <a:masterClrMapping/>
+  </p:clrMapOvr>
+</p:sld>
+</file>
+
+<file path=ppt/slides/slide2.xml><?xml version="1.0" encoding="utf-8"?>
+<p:sld xmlns:a="http://schemas.openxmlformats.org/drawingml/2006/main" xmlns:r="http://schemas.openxmlformats.org/officeDocument/2006/relationships" xmlns:p="http://schemas.openxmlformats.org/presentationml/2006/main">
+  <p:cSld>
+    <p:spTree>
+      <p:nvGrpSpPr>
+        <p:cNvPr id="1" name=""/>
+        <p:cNvGrpSpPr/>
+        <p:nvPr/>
+      </p:nvGrpSpPr>
+      <p:grpSpPr>
+        <a:xfrm>
+          <a:off x="0" y="0"/>
+          <a:ext cx="0" cy="0"/>
+          <a:chOff x="0" y="0"/>
+          <a:chExt cx="0" cy="0"/>
+        </a:xfrm>
+      </p:grpSpPr>
+      <p:grpSp>
+        <p:nvGrpSpPr>
+          <p:cNvPr id="21" name="Group 20">
+            <a:extLst>
+              <a:ext uri="{FF2B5EF4-FFF2-40B4-BE49-F238E27FC236}">
+                <a16:creationId xmlns:a16="http://schemas.microsoft.com/office/drawing/2014/main" id="{8A1FB39A-2BE4-7AEE-8428-1D6AE301BA43}"/>
+              </a:ext>
+            </a:extLst>
+          </p:cNvPr>
+          <p:cNvGrpSpPr>
+            <a:grpSpLocks noChangeAspect="1"/>
+          </p:cNvGrpSpPr>
+          <p:nvPr/>
+        </p:nvGrpSpPr>
+        <p:grpSpPr>
+          <a:xfrm>
+            <a:off x="0" y="-198810"/>
+            <a:ext cx="12625824" cy="64008000"/>
+            <a:chOff x="4376962" y="62447"/>
+            <a:chExt cx="3080006" cy="15614434"/>
+          </a:xfrm>
+        </p:grpSpPr>
+        <p:sp>
+          <p:nvSpPr>
+            <p:cNvPr id="18" name="Rectangle 17">
+              <a:extLst>
+                <a:ext uri="{FF2B5EF4-FFF2-40B4-BE49-F238E27FC236}">
+                  <a16:creationId xmlns:a16="http://schemas.microsoft.com/office/drawing/2014/main" id="{3F06F37D-6539-9D8F-9A03-70DE375EA224}"/>
+                </a:ext>
+              </a:extLst>
+            </p:cNvPr>
+            <p:cNvSpPr/>
+            <p:nvPr/>
+          </p:nvSpPr>
+          <p:spPr>
+            <a:xfrm>
+              <a:off x="4376962" y="62447"/>
+              <a:ext cx="3080006" cy="15614434"/>
+            </a:xfrm>
+            <a:prstGeom prst="rect">
+              <a:avLst/>
+            </a:prstGeom>
+            <a:solidFill>
+              <a:schemeClr val="bg1"/>
+            </a:solidFill>
+            <a:ln>
+              <a:noFill/>
+            </a:ln>
+          </p:spPr>
+          <p:style>
+            <a:lnRef idx="2">
+              <a:schemeClr val="accent1">
+                <a:shade val="50000"/>
+              </a:schemeClr>
+            </a:lnRef>
+            <a:fillRef idx="1">
+              <a:schemeClr val="accent1"/>
+            </a:fillRef>
+            <a:effectRef idx="0">
+              <a:schemeClr val="accent1"/>
+            </a:effectRef>
+            <a:fontRef idx="minor">
+              <a:schemeClr val="lt1"/>
+            </a:fontRef>
+          </p:style>
+          <p:txBody>
+            <a:bodyPr rtlCol="0" anchor="ctr"/>
+            <a:lstStyle/>
+            <a:p>
+              <a:pPr algn="ctr"/>
+              <a:endParaRPr lang="en-US"/>
+            </a:p>
+          </p:txBody>
+        </p:sp>
+        <p:pic>
+          <p:nvPicPr>
+            <p:cNvPr id="2" name="Picture 1">
+              <a:extLst>
+                <a:ext uri="{FF2B5EF4-FFF2-40B4-BE49-F238E27FC236}">
+                  <a16:creationId xmlns:a16="http://schemas.microsoft.com/office/drawing/2014/main" id="{B1D444CB-97DF-EA5A-9E1B-EC052345AC41}"/>
+                </a:ext>
+              </a:extLst>
+            </p:cNvPr>
+            <p:cNvPicPr>
+              <a:picLocks noChangeAspect="1"/>
+            </p:cNvPicPr>
+            <p:nvPr/>
+          </p:nvPicPr>
+          <p:blipFill>
+            <a:blip r:embed="rId3"/>
+            <a:stretch>
+              <a:fillRect/>
+            </a:stretch>
+          </p:blipFill>
+          <p:spPr>
+            <a:xfrm>
+              <a:off x="4456416" y="110392"/>
+              <a:ext cx="2916456" cy="2393804"/>
+            </a:xfrm>
+            <a:prstGeom prst="rect">
+              <a:avLst/>
+            </a:prstGeom>
+          </p:spPr>
+        </p:pic>
+        <p:pic>
+          <p:nvPicPr>
+            <p:cNvPr id="4" name="Picture 3">
+              <a:extLst>
+                <a:ext uri="{FF2B5EF4-FFF2-40B4-BE49-F238E27FC236}">
+                  <a16:creationId xmlns:a16="http://schemas.microsoft.com/office/drawing/2014/main" id="{6C00E37E-F36C-99EA-7CE1-1761A747914C}"/>
+                </a:ext>
+              </a:extLst>
+            </p:cNvPr>
+            <p:cNvPicPr>
+              <a:picLocks noChangeAspect="1"/>
+            </p:cNvPicPr>
+            <p:nvPr/>
+          </p:nvPicPr>
+          <p:blipFill>
+            <a:blip r:embed="rId4"/>
+            <a:stretch>
+              <a:fillRect/>
+            </a:stretch>
+          </p:blipFill>
+          <p:spPr>
+            <a:xfrm>
+              <a:off x="4456416" y="2594458"/>
+              <a:ext cx="2933498" cy="1197561"/>
+            </a:xfrm>
+            <a:prstGeom prst="rect">
+              <a:avLst/>
+            </a:prstGeom>
+          </p:spPr>
+        </p:pic>
+        <p:pic>
+          <p:nvPicPr>
+            <p:cNvPr id="5" name="Picture 4">
+              <a:extLst>
+                <a:ext uri="{FF2B5EF4-FFF2-40B4-BE49-F238E27FC236}">
+                  <a16:creationId xmlns:a16="http://schemas.microsoft.com/office/drawing/2014/main" id="{A6541BBA-9229-A501-B423-D699B90B5C62}"/>
+                </a:ext>
+              </a:extLst>
+            </p:cNvPr>
+            <p:cNvPicPr>
+              <a:picLocks noChangeAspect="1"/>
+            </p:cNvPicPr>
+            <p:nvPr/>
+          </p:nvPicPr>
+          <p:blipFill>
+            <a:blip r:embed="rId5"/>
+            <a:stretch>
+              <a:fillRect/>
+            </a:stretch>
+          </p:blipFill>
+          <p:spPr>
+            <a:xfrm>
+              <a:off x="4417565" y="3763795"/>
+              <a:ext cx="3006438" cy="2832664"/>
+            </a:xfrm>
+            <a:prstGeom prst="rect">
+              <a:avLst/>
+            </a:prstGeom>
+          </p:spPr>
+        </p:pic>
+        <p:pic>
+          <p:nvPicPr>
+            <p:cNvPr id="6" name="Picture 5">
+              <a:extLst>
+                <a:ext uri="{FF2B5EF4-FFF2-40B4-BE49-F238E27FC236}">
+                  <a16:creationId xmlns:a16="http://schemas.microsoft.com/office/drawing/2014/main" id="{1B57FE0D-CBE1-8F7B-6871-C8A6606066F0}"/>
+                </a:ext>
+              </a:extLst>
+            </p:cNvPr>
+            <p:cNvPicPr>
+              <a:picLocks noChangeAspect="1"/>
+            </p:cNvPicPr>
+            <p:nvPr/>
+          </p:nvPicPr>
+          <p:blipFill>
+            <a:blip r:embed="rId6"/>
+            <a:stretch>
+              <a:fillRect/>
+            </a:stretch>
+          </p:blipFill>
+          <p:spPr>
+            <a:xfrm>
+              <a:off x="4473457" y="6721853"/>
+              <a:ext cx="2944046" cy="683439"/>
+            </a:xfrm>
+            <a:prstGeom prst="rect">
+              <a:avLst/>
+            </a:prstGeom>
+          </p:spPr>
+        </p:pic>
+        <p:pic>
+          <p:nvPicPr>
+            <p:cNvPr id="7" name="Picture 6">
+              <a:extLst>
+                <a:ext uri="{FF2B5EF4-FFF2-40B4-BE49-F238E27FC236}">
+                  <a16:creationId xmlns:a16="http://schemas.microsoft.com/office/drawing/2014/main" id="{2BCCBDAF-F497-D437-50CC-0657EE6F043E}"/>
+                </a:ext>
+              </a:extLst>
+            </p:cNvPr>
+            <p:cNvPicPr>
+              <a:picLocks noChangeAspect="1"/>
+            </p:cNvPicPr>
+            <p:nvPr/>
+          </p:nvPicPr>
+          <p:blipFill>
+            <a:blip r:embed="rId7"/>
+            <a:stretch>
+              <a:fillRect/>
+            </a:stretch>
+          </p:blipFill>
+          <p:spPr>
+            <a:xfrm>
+              <a:off x="4484630" y="7380807"/>
+              <a:ext cx="2905283" cy="2638471"/>
+            </a:xfrm>
+            <a:prstGeom prst="rect">
+              <a:avLst/>
+            </a:prstGeom>
+          </p:spPr>
+        </p:pic>
+        <p:pic>
+          <p:nvPicPr>
+            <p:cNvPr id="9" name="Picture 8">
+              <a:extLst>
+                <a:ext uri="{FF2B5EF4-FFF2-40B4-BE49-F238E27FC236}">
+                  <a16:creationId xmlns:a16="http://schemas.microsoft.com/office/drawing/2014/main" id="{26BDDEEB-B3B6-112E-F165-574917992FBD}"/>
+                </a:ext>
+              </a:extLst>
+            </p:cNvPr>
+            <p:cNvPicPr>
+              <a:picLocks noChangeAspect="1"/>
+            </p:cNvPicPr>
+            <p:nvPr/>
+          </p:nvPicPr>
+          <p:blipFill>
+            <a:blip r:embed="rId8"/>
+            <a:stretch>
+              <a:fillRect/>
+            </a:stretch>
+          </p:blipFill>
+          <p:spPr>
+            <a:xfrm>
+              <a:off x="4500888" y="10074241"/>
+              <a:ext cx="2905283" cy="944735"/>
+            </a:xfrm>
+            <a:prstGeom prst="rect">
+              <a:avLst/>
+            </a:prstGeom>
+          </p:spPr>
+        </p:pic>
+        <p:pic>
+          <p:nvPicPr>
+            <p:cNvPr id="11" name="Picture 10">
+              <a:extLst>
+                <a:ext uri="{FF2B5EF4-FFF2-40B4-BE49-F238E27FC236}">
+                  <a16:creationId xmlns:a16="http://schemas.microsoft.com/office/drawing/2014/main" id="{36EC3FB1-8E52-BC5B-8199-B53253365691}"/>
+                </a:ext>
+              </a:extLst>
+            </p:cNvPr>
+            <p:cNvPicPr>
+              <a:picLocks noChangeAspect="1"/>
+            </p:cNvPicPr>
+            <p:nvPr/>
+          </p:nvPicPr>
+          <p:blipFill>
+            <a:blip r:embed="rId9"/>
+            <a:stretch>
+              <a:fillRect/>
+            </a:stretch>
+          </p:blipFill>
+          <p:spPr>
+            <a:xfrm>
+              <a:off x="4419633" y="11002585"/>
+              <a:ext cx="2986538" cy="2169606"/>
+            </a:xfrm>
+            <a:prstGeom prst="rect">
+              <a:avLst/>
+            </a:prstGeom>
+          </p:spPr>
+        </p:pic>
+        <p:pic>
+          <p:nvPicPr>
+            <p:cNvPr id="12" name="Picture 11">
+              <a:extLst>
+                <a:ext uri="{FF2B5EF4-FFF2-40B4-BE49-F238E27FC236}">
+                  <a16:creationId xmlns:a16="http://schemas.microsoft.com/office/drawing/2014/main" id="{D1D2EA05-98EB-1488-B950-324CBA7035C4}"/>
+                </a:ext>
+              </a:extLst>
+            </p:cNvPr>
+            <p:cNvPicPr>
+              <a:picLocks noChangeAspect="1"/>
+            </p:cNvPicPr>
+            <p:nvPr/>
+          </p:nvPicPr>
+          <p:blipFill>
+            <a:blip r:embed="rId10"/>
+            <a:stretch>
+              <a:fillRect/>
+            </a:stretch>
+          </p:blipFill>
+          <p:spPr>
+            <a:xfrm>
+              <a:off x="4434282" y="13205242"/>
+              <a:ext cx="2983220" cy="1113893"/>
+            </a:xfrm>
+            <a:prstGeom prst="rect">
+              <a:avLst/>
+            </a:prstGeom>
+          </p:spPr>
+        </p:pic>
+        <p:pic>
+          <p:nvPicPr>
+            <p:cNvPr id="13" name="Picture 12">
+              <a:extLst>
+                <a:ext uri="{FF2B5EF4-FFF2-40B4-BE49-F238E27FC236}">
+                  <a16:creationId xmlns:a16="http://schemas.microsoft.com/office/drawing/2014/main" id="{7D55D7F9-D8A2-E9A2-9C0A-EDFB0717F844}"/>
+                </a:ext>
+              </a:extLst>
+            </p:cNvPr>
+            <p:cNvPicPr>
+              <a:picLocks noChangeAspect="1"/>
+            </p:cNvPicPr>
+            <p:nvPr/>
+          </p:nvPicPr>
+          <p:blipFill>
+            <a:blip r:embed="rId11"/>
+            <a:stretch>
+              <a:fillRect/>
+            </a:stretch>
+          </p:blipFill>
+          <p:spPr>
+            <a:xfrm>
+              <a:off x="4436530" y="14352186"/>
+              <a:ext cx="2980972" cy="951308"/>
+            </a:xfrm>
+            <a:prstGeom prst="rect">
+              <a:avLst/>
+            </a:prstGeom>
+          </p:spPr>
+        </p:pic>
+        <p:pic>
+          <p:nvPicPr>
+            <p:cNvPr id="17" name="Picture 16">
+              <a:extLst>
+                <a:ext uri="{FF2B5EF4-FFF2-40B4-BE49-F238E27FC236}">
+                  <a16:creationId xmlns:a16="http://schemas.microsoft.com/office/drawing/2014/main" id="{82B520A6-0914-0494-7243-2E9CBFADB431}"/>
+                </a:ext>
+              </a:extLst>
+            </p:cNvPr>
+            <p:cNvPicPr>
+              <a:picLocks noChangeAspect="1"/>
+            </p:cNvPicPr>
+            <p:nvPr/>
+          </p:nvPicPr>
+          <p:blipFill>
+            <a:blip r:embed="rId12"/>
+            <a:stretch>
+              <a:fillRect/>
+            </a:stretch>
+          </p:blipFill>
+          <p:spPr>
+            <a:xfrm>
+              <a:off x="5991635" y="15358457"/>
+              <a:ext cx="1398278" cy="237638"/>
+            </a:xfrm>
+            <a:prstGeom prst="rect">
+              <a:avLst/>
+            </a:prstGeom>
+          </p:spPr>
+        </p:pic>
+      </p:grpSp>
+    </p:spTree>
+    <p:extLst>
+      <p:ext uri="{BB962C8B-B14F-4D97-AF65-F5344CB8AC3E}">
+        <p14:creationId xmlns:p14="http://schemas.microsoft.com/office/powerpoint/2010/main" val="3060849795"/>
       </p:ext>
     </p:extLst>
   </p:cSld>

</xml_diff>